<commit_message>
feat: update pc frontend
</commit_message>
<xml_diff>
--- a/loghome-app-frontend/启动图.pptx
+++ b/loghome-app-frontend/启动图.pptx
@@ -7,6 +7,7 @@
   <p:sldIdLst>
     <p:sldId id="256" r:id="rId2"/>
     <p:sldId id="257" r:id="rId3"/>
+    <p:sldId id="258" r:id="rId4"/>
   </p:sldIdLst>
   <p:sldSz cx="8572500" cy="18562638"/>
   <p:notesSz cx="6858000" cy="9144000"/>
@@ -255,7 +256,7 @@
           <a:p>
             <a:fld id="{657DBD1E-E1DF-4A86-ACAD-71C5B32CFCCB}" type="datetimeFigureOut">
               <a:rPr lang="zh-CN" altLang="en-US" smtClean="0"/>
-              <a:t>2022/12/11</a:t>
+              <a:t>2025/4/9</a:t>
             </a:fld>
             <a:endParaRPr lang="zh-CN" altLang="en-US"/>
           </a:p>
@@ -425,7 +426,7 @@
           <a:p>
             <a:fld id="{657DBD1E-E1DF-4A86-ACAD-71C5B32CFCCB}" type="datetimeFigureOut">
               <a:rPr lang="zh-CN" altLang="en-US" smtClean="0"/>
-              <a:t>2022/12/11</a:t>
+              <a:t>2025/4/9</a:t>
             </a:fld>
             <a:endParaRPr lang="zh-CN" altLang="en-US"/>
           </a:p>
@@ -605,7 +606,7 @@
           <a:p>
             <a:fld id="{657DBD1E-E1DF-4A86-ACAD-71C5B32CFCCB}" type="datetimeFigureOut">
               <a:rPr lang="zh-CN" altLang="en-US" smtClean="0"/>
-              <a:t>2022/12/11</a:t>
+              <a:t>2025/4/9</a:t>
             </a:fld>
             <a:endParaRPr lang="zh-CN" altLang="en-US"/>
           </a:p>
@@ -775,7 +776,7 @@
           <a:p>
             <a:fld id="{657DBD1E-E1DF-4A86-ACAD-71C5B32CFCCB}" type="datetimeFigureOut">
               <a:rPr lang="zh-CN" altLang="en-US" smtClean="0"/>
-              <a:t>2022/12/11</a:t>
+              <a:t>2025/4/9</a:t>
             </a:fld>
             <a:endParaRPr lang="zh-CN" altLang="en-US"/>
           </a:p>
@@ -1019,7 +1020,7 @@
           <a:p>
             <a:fld id="{657DBD1E-E1DF-4A86-ACAD-71C5B32CFCCB}" type="datetimeFigureOut">
               <a:rPr lang="zh-CN" altLang="en-US" smtClean="0"/>
-              <a:t>2022/12/11</a:t>
+              <a:t>2025/4/9</a:t>
             </a:fld>
             <a:endParaRPr lang="zh-CN" altLang="en-US"/>
           </a:p>
@@ -1251,7 +1252,7 @@
           <a:p>
             <a:fld id="{657DBD1E-E1DF-4A86-ACAD-71C5B32CFCCB}" type="datetimeFigureOut">
               <a:rPr lang="zh-CN" altLang="en-US" smtClean="0"/>
-              <a:t>2022/12/11</a:t>
+              <a:t>2025/4/9</a:t>
             </a:fld>
             <a:endParaRPr lang="zh-CN" altLang="en-US"/>
           </a:p>
@@ -1618,7 +1619,7 @@
           <a:p>
             <a:fld id="{657DBD1E-E1DF-4A86-ACAD-71C5B32CFCCB}" type="datetimeFigureOut">
               <a:rPr lang="zh-CN" altLang="en-US" smtClean="0"/>
-              <a:t>2022/12/11</a:t>
+              <a:t>2025/4/9</a:t>
             </a:fld>
             <a:endParaRPr lang="zh-CN" altLang="en-US"/>
           </a:p>
@@ -1736,7 +1737,7 @@
           <a:p>
             <a:fld id="{657DBD1E-E1DF-4A86-ACAD-71C5B32CFCCB}" type="datetimeFigureOut">
               <a:rPr lang="zh-CN" altLang="en-US" smtClean="0"/>
-              <a:t>2022/12/11</a:t>
+              <a:t>2025/4/9</a:t>
             </a:fld>
             <a:endParaRPr lang="zh-CN" altLang="en-US"/>
           </a:p>
@@ -1831,7 +1832,7 @@
           <a:p>
             <a:fld id="{657DBD1E-E1DF-4A86-ACAD-71C5B32CFCCB}" type="datetimeFigureOut">
               <a:rPr lang="zh-CN" altLang="en-US" smtClean="0"/>
-              <a:t>2022/12/11</a:t>
+              <a:t>2025/4/9</a:t>
             </a:fld>
             <a:endParaRPr lang="zh-CN" altLang="en-US"/>
           </a:p>
@@ -2108,7 +2109,7 @@
           <a:p>
             <a:fld id="{657DBD1E-E1DF-4A86-ACAD-71C5B32CFCCB}" type="datetimeFigureOut">
               <a:rPr lang="zh-CN" altLang="en-US" smtClean="0"/>
-              <a:t>2022/12/11</a:t>
+              <a:t>2025/4/9</a:t>
             </a:fld>
             <a:endParaRPr lang="zh-CN" altLang="en-US"/>
           </a:p>
@@ -2365,7 +2366,7 @@
           <a:p>
             <a:fld id="{657DBD1E-E1DF-4A86-ACAD-71C5B32CFCCB}" type="datetimeFigureOut">
               <a:rPr lang="zh-CN" altLang="en-US" smtClean="0"/>
-              <a:t>2022/12/11</a:t>
+              <a:t>2025/4/9</a:t>
             </a:fld>
             <a:endParaRPr lang="zh-CN" altLang="en-US"/>
           </a:p>
@@ -2578,7 +2579,7 @@
           <a:p>
             <a:fld id="{657DBD1E-E1DF-4A86-ACAD-71C5B32CFCCB}" type="datetimeFigureOut">
               <a:rPr lang="zh-CN" altLang="en-US" smtClean="0"/>
-              <a:t>2022/12/11</a:t>
+              <a:t>2025/4/9</a:t>
             </a:fld>
             <a:endParaRPr lang="zh-CN" altLang="en-US"/>
           </a:p>
@@ -3350,6 +3351,106 @@
 </p:sld>
 </file>
 
+<file path=ppt/slides/slide3.xml><?xml version="1.0" encoding="utf-8"?>
+<p:sld xmlns:a="http://schemas.openxmlformats.org/drawingml/2006/main" xmlns:r="http://schemas.openxmlformats.org/officeDocument/2006/relationships" xmlns:p="http://schemas.openxmlformats.org/presentationml/2006/main">
+  <p:cSld>
+    <p:spTree>
+      <p:nvGrpSpPr>
+        <p:cNvPr id="1" name=""/>
+        <p:cNvGrpSpPr/>
+        <p:nvPr/>
+      </p:nvGrpSpPr>
+      <p:grpSpPr>
+        <a:xfrm>
+          <a:off x="0" y="0"/>
+          <a:ext cx="0" cy="0"/>
+          <a:chOff x="0" y="0"/>
+          <a:chExt cx="0" cy="0"/>
+        </a:xfrm>
+      </p:grpSpPr>
+      <p:pic>
+        <p:nvPicPr>
+          <p:cNvPr id="5" name="图片 4">
+            <a:extLst>
+              <a:ext uri="{FF2B5EF4-FFF2-40B4-BE49-F238E27FC236}">
+                <a16:creationId xmlns:a16="http://schemas.microsoft.com/office/drawing/2014/main" id="{8C716A37-61CB-4C6B-8062-0C400080A92B}"/>
+              </a:ext>
+            </a:extLst>
+          </p:cNvPr>
+          <p:cNvPicPr>
+            <a:picLocks noChangeAspect="1"/>
+          </p:cNvPicPr>
+          <p:nvPr/>
+        </p:nvPicPr>
+        <p:blipFill rotWithShape="1">
+          <a:blip r:embed="rId2">
+            <a:extLst>
+              <a:ext uri="{28A0092B-C50C-407E-A947-70E740481C1C}">
+                <a14:useLocalDpi xmlns:a14="http://schemas.microsoft.com/office/drawing/2010/main" val="0"/>
+              </a:ext>
+            </a:extLst>
+          </a:blip>
+          <a:srcRect l="3785" t="12086" r="81962" b="81840"/>
+          <a:stretch/>
+        </p:blipFill>
+        <p:spPr>
+          <a:xfrm>
+            <a:off x="609600" y="2243328"/>
+            <a:ext cx="1133856" cy="1127760"/>
+          </a:xfrm>
+          <a:prstGeom prst="rect">
+            <a:avLst/>
+          </a:prstGeom>
+        </p:spPr>
+      </p:pic>
+      <p:pic>
+        <p:nvPicPr>
+          <p:cNvPr id="6" name="图片 5">
+            <a:extLst>
+              <a:ext uri="{FF2B5EF4-FFF2-40B4-BE49-F238E27FC236}">
+                <a16:creationId xmlns:a16="http://schemas.microsoft.com/office/drawing/2014/main" id="{88DA73A2-2E1A-42A0-943B-120C51F860E9}"/>
+              </a:ext>
+            </a:extLst>
+          </p:cNvPr>
+          <p:cNvPicPr>
+            <a:picLocks noChangeAspect="1"/>
+          </p:cNvPicPr>
+          <p:nvPr/>
+        </p:nvPicPr>
+        <p:blipFill rotWithShape="1">
+          <a:blip r:embed="rId2">
+            <a:extLst>
+              <a:ext uri="{28A0092B-C50C-407E-A947-70E740481C1C}">
+                <a14:useLocalDpi xmlns:a14="http://schemas.microsoft.com/office/drawing/2010/main" val="0"/>
+              </a:ext>
+            </a:extLst>
+          </a:blip>
+          <a:srcRect l="3785" t="21049" r="81962" b="72943"/>
+          <a:stretch/>
+        </p:blipFill>
+        <p:spPr>
+          <a:xfrm>
+            <a:off x="2182368" y="2249424"/>
+            <a:ext cx="1133856" cy="1115568"/>
+          </a:xfrm>
+          <a:prstGeom prst="rect">
+            <a:avLst/>
+          </a:prstGeom>
+        </p:spPr>
+      </p:pic>
+    </p:spTree>
+    <p:extLst>
+      <p:ext uri="{BB962C8B-B14F-4D97-AF65-F5344CB8AC3E}">
+        <p14:creationId xmlns:p14="http://schemas.microsoft.com/office/powerpoint/2010/main" val="2087339564"/>
+      </p:ext>
+    </p:extLst>
+  </p:cSld>
+  <p:clrMapOvr>
+    <a:masterClrMapping/>
+  </p:clrMapOvr>
+</p:sld>
+</file>
+
 <file path=ppt/theme/theme1.xml><?xml version="1.0" encoding="utf-8"?>
 <a:theme xmlns:a="http://schemas.openxmlformats.org/drawingml/2006/main" name="Office 主题​​">
   <a:themeElements>

</xml_diff>